<commit_message>
added: -some descriptive text to the BigJob Condor and Cloud slides -description to experiments
Lukasz could you please check the Condor slide for correctness?



git-svn-id: file://localhost/tmp/svn2git/svn@2660 defb5e50-622e-49ec-a68e-d72c7db87b45
</commit_message>
<xml_diff>
--- a/papers/ccgrid10/bigjob_ccgrid10.pptx
+++ b/papers/ccgrid10/bigjob_ccgrid10.pptx
@@ -211,7 +211,7 @@
             <a:fld id="{8E161E8F-4E15-A840-9658-105F9DD3DE22}" type="datetimeFigureOut">
               <a:rPr lang="en-US" smtClean="0"/>
               <a:pPr/>
-              <a:t>5/16/10</a:t>
+              <a:t>17.05.2010</a:t>
             </a:fld>
             <a:endParaRPr lang="en-US"/>
           </a:p>
@@ -373,7 +373,7 @@
             <a:fld id="{D344DA2A-F2F4-D74A-8AEC-1933B33E97E0}" type="slidenum">
               <a:rPr lang="en-US" smtClean="0"/>
               <a:pPr/>
-              <a:t>‹#›</a:t>
+              <a:t>‹Nr.›</a:t>
             </a:fld>
             <a:endParaRPr lang="en-US"/>
           </a:p>
@@ -562,6 +562,558 @@
 <file path=ppt/notesSlides/notesSlide2.xml><?xml version="1.0" encoding="utf-8"?>
 <p:notes xmlns:a="http://schemas.openxmlformats.org/drawingml/2006/main" xmlns:r="http://schemas.openxmlformats.org/officeDocument/2006/relationships" xmlns:mc="http://schemas.openxmlformats.org/markup-compatibility/2006" xmlns:mv="urn:schemas-microsoft-com:mac:vml" xmlns:p="http://schemas.openxmlformats.org/presentationml/2006/main" mc:Ignorable="mv" mc:PreserveAttributes="mv:*">
   <p:cSld>
+    <p:spTree>
+      <p:nvGrpSpPr>
+        <p:cNvPr id="1" name=""/>
+        <p:cNvGrpSpPr/>
+        <p:nvPr/>
+      </p:nvGrpSpPr>
+      <p:grpSpPr>
+        <a:xfrm>
+          <a:off x="0" y="0"/>
+          <a:ext cx="0" cy="0"/>
+          <a:chOff x="0" y="0"/>
+          <a:chExt cx="0" cy="0"/>
+        </a:xfrm>
+      </p:grpSpPr>
+      <p:sp>
+        <p:nvSpPr>
+          <p:cNvPr id="2" name="Folienbildplatzhalter 1"/>
+          <p:cNvSpPr>
+            <a:spLocks noGrp="1" noRot="1" noChangeAspect="1"/>
+          </p:cNvSpPr>
+          <p:nvPr>
+            <p:ph type="sldImg"/>
+          </p:nvPr>
+        </p:nvSpPr>
+        <p:spPr/>
+      </p:sp>
+      <p:sp>
+        <p:nvSpPr>
+          <p:cNvPr id="3" name="Notizenplatzhalter 2"/>
+          <p:cNvSpPr>
+            <a:spLocks noGrp="1"/>
+          </p:cNvSpPr>
+          <p:nvPr>
+            <p:ph type="body" idx="1"/>
+          </p:nvPr>
+        </p:nvSpPr>
+        <p:spPr/>
+        <p:txBody>
+          <a:bodyPr>
+            <a:normAutofit/>
+          </a:bodyPr>
+          <a:lstStyle/>
+          <a:p>
+            <a:pPr marL="0" marR="0" indent="0" algn="l" defTabSz="457200" rtl="0" eaLnBrk="1" fontAlgn="auto" latinLnBrk="0" hangingPunct="1">
+              <a:lnSpc>
+                <a:spcPct val="100000"/>
+              </a:lnSpc>
+              <a:spcBef>
+                <a:spcPts val="0"/>
+              </a:spcBef>
+              <a:spcAft>
+                <a:spcPts val="0"/>
+              </a:spcAft>
+              <a:buClrTx/>
+              <a:buSzTx/>
+              <a:buFontTx/>
+              <a:buNone/>
+              <a:tabLst/>
+              <a:defRPr/>
+            </a:pPr>
+            <a:r>
+              <a:rPr lang="en-US" dirty="0" smtClean="0"/>
+              <a:t>Lukasz Please add descriptive text:</a:t>
+            </a:r>
+          </a:p>
+          <a:p>
+            <a:pPr marL="0" marR="0" indent="0" algn="l" defTabSz="457200" rtl="0" eaLnBrk="1" fontAlgn="auto" latinLnBrk="0" hangingPunct="1">
+              <a:lnSpc>
+                <a:spcPct val="100000"/>
+              </a:lnSpc>
+              <a:spcBef>
+                <a:spcPts val="0"/>
+              </a:spcBef>
+              <a:spcAft>
+                <a:spcPts val="0"/>
+              </a:spcAft>
+              <a:buClrTx/>
+              <a:buSzTx/>
+              <a:buFontTx/>
+              <a:buNone/>
+              <a:tabLst/>
+              <a:defRPr/>
+            </a:pPr>
+            <a:endParaRPr lang="en-US" dirty="0" smtClean="0"/>
+          </a:p>
+          <a:p>
+            <a:pPr marL="0" marR="0" indent="0" algn="l" defTabSz="457200" rtl="0" eaLnBrk="1" fontAlgn="auto" latinLnBrk="0" hangingPunct="1">
+              <a:lnSpc>
+                <a:spcPct val="100000"/>
+              </a:lnSpc>
+              <a:spcBef>
+                <a:spcPts val="0"/>
+              </a:spcBef>
+              <a:spcAft>
+                <a:spcPts val="0"/>
+              </a:spcAft>
+              <a:buClrTx/>
+              <a:buSzTx/>
+              <a:buFontTx/>
+              <a:buNone/>
+              <a:tabLst/>
+              <a:defRPr/>
+            </a:pPr>
+            <a:r>
+              <a:rPr lang="de-DE" sz="1200" kern="1200" smtClean="0">
+                <a:solidFill>
+                  <a:schemeClr val="tx1"/>
+                </a:solidFill>
+                <a:latin typeface="+mn-lt"/>
+                <a:ea typeface="+mn-ea"/>
+                <a:cs typeface="+mn-cs"/>
+              </a:rPr>
+              <a:t>„A </a:t>
+            </a:r>
+            <a:r>
+              <a:rPr lang="de-DE" sz="1200" kern="1200" dirty="0" err="1" smtClean="0">
+                <a:solidFill>
+                  <a:schemeClr val="tx1"/>
+                </a:solidFill>
+                <a:latin typeface="+mn-lt"/>
+                <a:ea typeface="+mn-ea"/>
+                <a:cs typeface="+mn-cs"/>
+              </a:rPr>
+              <a:t>Condor</a:t>
+            </a:r>
+            <a:r>
+              <a:rPr lang="de-DE" sz="1200" kern="1200" dirty="0" smtClean="0">
+                <a:solidFill>
+                  <a:schemeClr val="tx1"/>
+                </a:solidFill>
+                <a:latin typeface="+mn-lt"/>
+                <a:ea typeface="+mn-ea"/>
+                <a:cs typeface="+mn-cs"/>
+              </a:rPr>
+              <a:t> Pilot-Job </a:t>
+            </a:r>
+            <a:r>
+              <a:rPr lang="de-DE" sz="1200" kern="1200" dirty="0" err="1" smtClean="0">
+                <a:solidFill>
+                  <a:schemeClr val="tx1"/>
+                </a:solidFill>
+                <a:latin typeface="+mn-lt"/>
+                <a:ea typeface="+mn-ea"/>
+                <a:cs typeface="+mn-cs"/>
+              </a:rPr>
+              <a:t>from</a:t>
+            </a:r>
+            <a:r>
+              <a:rPr lang="de-DE" sz="1200" kern="1200" dirty="0" smtClean="0">
+                <a:solidFill>
+                  <a:schemeClr val="tx1"/>
+                </a:solidFill>
+                <a:latin typeface="+mn-lt"/>
+                <a:ea typeface="+mn-ea"/>
+                <a:cs typeface="+mn-cs"/>
+              </a:rPr>
+              <a:t> an </a:t>
+            </a:r>
+            <a:r>
+              <a:rPr lang="de-DE" sz="1200" kern="1200" dirty="0" err="1" smtClean="0">
+                <a:solidFill>
+                  <a:schemeClr val="tx1"/>
+                </a:solidFill>
+                <a:latin typeface="+mn-lt"/>
+                <a:ea typeface="+mn-ea"/>
+                <a:cs typeface="+mn-cs"/>
+              </a:rPr>
+              <a:t>application</a:t>
+            </a:r>
+            <a:r>
+              <a:rPr lang="de-DE" sz="1200" kern="1200" dirty="0" smtClean="0">
+                <a:solidFill>
+                  <a:schemeClr val="tx1"/>
+                </a:solidFill>
+                <a:latin typeface="+mn-lt"/>
+                <a:ea typeface="+mn-ea"/>
+                <a:cs typeface="+mn-cs"/>
+              </a:rPr>
+              <a:t> point of </a:t>
+            </a:r>
+            <a:r>
+              <a:rPr lang="de-DE" sz="1200" kern="1200" dirty="0" err="1" smtClean="0">
+                <a:solidFill>
+                  <a:schemeClr val="tx1"/>
+                </a:solidFill>
+                <a:latin typeface="+mn-lt"/>
+                <a:ea typeface="+mn-ea"/>
+                <a:cs typeface="+mn-cs"/>
+              </a:rPr>
+              <a:t>view</a:t>
+            </a:r>
+            <a:r>
+              <a:rPr lang="de-DE" sz="1200" kern="1200" dirty="0" smtClean="0">
+                <a:solidFill>
+                  <a:schemeClr val="tx1"/>
+                </a:solidFill>
+                <a:latin typeface="+mn-lt"/>
+                <a:ea typeface="+mn-ea"/>
+                <a:cs typeface="+mn-cs"/>
+              </a:rPr>
+              <a:t> </a:t>
+            </a:r>
+            <a:r>
+              <a:rPr lang="de-DE" sz="1200" kern="1200" dirty="0" err="1" smtClean="0">
+                <a:solidFill>
+                  <a:schemeClr val="tx1"/>
+                </a:solidFill>
+                <a:latin typeface="+mn-lt"/>
+                <a:ea typeface="+mn-ea"/>
+                <a:cs typeface="+mn-cs"/>
+              </a:rPr>
+              <a:t>is</a:t>
+            </a:r>
+            <a:r>
+              <a:rPr lang="de-DE" sz="1200" kern="1200" dirty="0" smtClean="0">
+                <a:solidFill>
+                  <a:schemeClr val="tx1"/>
+                </a:solidFill>
+                <a:latin typeface="+mn-lt"/>
+                <a:ea typeface="+mn-ea"/>
+                <a:cs typeface="+mn-cs"/>
+              </a:rPr>
+              <a:t> a </a:t>
+            </a:r>
+            <a:r>
+              <a:rPr lang="de-DE" sz="1200" kern="1200" dirty="0" err="1" smtClean="0">
+                <a:solidFill>
+                  <a:schemeClr val="tx1"/>
+                </a:solidFill>
+                <a:latin typeface="+mn-lt"/>
+                <a:ea typeface="+mn-ea"/>
+                <a:cs typeface="+mn-cs"/>
+              </a:rPr>
+              <a:t>request</a:t>
+            </a:r>
+            <a:r>
+              <a:rPr lang="de-DE" sz="1200" kern="1200" dirty="0" smtClean="0">
+                <a:solidFill>
+                  <a:schemeClr val="tx1"/>
+                </a:solidFill>
+                <a:latin typeface="+mn-lt"/>
+                <a:ea typeface="+mn-ea"/>
+                <a:cs typeface="+mn-cs"/>
+              </a:rPr>
+              <a:t> </a:t>
+            </a:r>
+            <a:r>
+              <a:rPr lang="de-DE" sz="1200" kern="1200" dirty="0" err="1" smtClean="0">
+                <a:solidFill>
+                  <a:schemeClr val="tx1"/>
+                </a:solidFill>
+                <a:latin typeface="+mn-lt"/>
+                <a:ea typeface="+mn-ea"/>
+                <a:cs typeface="+mn-cs"/>
+              </a:rPr>
+              <a:t>for</a:t>
+            </a:r>
+            <a:r>
+              <a:rPr lang="de-DE" sz="1200" kern="1200" dirty="0" smtClean="0">
+                <a:solidFill>
+                  <a:schemeClr val="tx1"/>
+                </a:solidFill>
+                <a:latin typeface="+mn-lt"/>
+                <a:ea typeface="+mn-ea"/>
+                <a:cs typeface="+mn-cs"/>
+              </a:rPr>
+              <a:t> a </a:t>
+            </a:r>
+            <a:r>
+              <a:rPr lang="de-DE" sz="1200" kern="1200" dirty="0" err="1" smtClean="0">
+                <a:solidFill>
+                  <a:schemeClr val="tx1"/>
+                </a:solidFill>
+                <a:latin typeface="+mn-lt"/>
+                <a:ea typeface="+mn-ea"/>
+                <a:cs typeface="+mn-cs"/>
+              </a:rPr>
+              <a:t>set</a:t>
+            </a:r>
+            <a:r>
+              <a:rPr lang="de-DE" sz="1200" kern="1200" dirty="0" smtClean="0">
+                <a:solidFill>
+                  <a:schemeClr val="tx1"/>
+                </a:solidFill>
+                <a:latin typeface="+mn-lt"/>
+                <a:ea typeface="+mn-ea"/>
+                <a:cs typeface="+mn-cs"/>
+              </a:rPr>
+              <a:t> of </a:t>
+            </a:r>
+            <a:r>
+              <a:rPr lang="de-DE" sz="1200" kern="1200" dirty="0" err="1" smtClean="0">
+                <a:solidFill>
+                  <a:schemeClr val="tx1"/>
+                </a:solidFill>
+                <a:latin typeface="+mn-lt"/>
+                <a:ea typeface="+mn-ea"/>
+                <a:cs typeface="+mn-cs"/>
+              </a:rPr>
+              <a:t>resources</a:t>
+            </a:r>
+            <a:r>
+              <a:rPr lang="de-DE" sz="1200" kern="1200" dirty="0" smtClean="0">
+                <a:solidFill>
+                  <a:schemeClr val="tx1"/>
+                </a:solidFill>
+                <a:latin typeface="+mn-lt"/>
+                <a:ea typeface="+mn-ea"/>
+                <a:cs typeface="+mn-cs"/>
+              </a:rPr>
+              <a:t> </a:t>
+            </a:r>
+            <a:r>
+              <a:rPr lang="de-DE" sz="1200" kern="1200" dirty="0" err="1" smtClean="0">
+                <a:solidFill>
+                  <a:schemeClr val="tx1"/>
+                </a:solidFill>
+                <a:latin typeface="+mn-lt"/>
+                <a:ea typeface="+mn-ea"/>
+                <a:cs typeface="+mn-cs"/>
+              </a:rPr>
+              <a:t>that</a:t>
+            </a:r>
+            <a:r>
+              <a:rPr lang="de-DE" sz="1200" kern="1200" dirty="0" smtClean="0">
+                <a:solidFill>
+                  <a:schemeClr val="tx1"/>
+                </a:solidFill>
+                <a:latin typeface="+mn-lt"/>
+                <a:ea typeface="+mn-ea"/>
+                <a:cs typeface="+mn-cs"/>
+              </a:rPr>
+              <a:t> </a:t>
+            </a:r>
+            <a:r>
+              <a:rPr lang="de-DE" sz="1200" kern="1200" dirty="0" err="1" smtClean="0">
+                <a:solidFill>
+                  <a:schemeClr val="tx1"/>
+                </a:solidFill>
+                <a:latin typeface="+mn-lt"/>
+                <a:ea typeface="+mn-ea"/>
+                <a:cs typeface="+mn-cs"/>
+              </a:rPr>
+              <a:t>can</a:t>
+            </a:r>
+            <a:r>
+              <a:rPr lang="de-DE" sz="1200" kern="1200" dirty="0" smtClean="0">
+                <a:solidFill>
+                  <a:schemeClr val="tx1"/>
+                </a:solidFill>
+                <a:latin typeface="+mn-lt"/>
+                <a:ea typeface="+mn-ea"/>
+                <a:cs typeface="+mn-cs"/>
+              </a:rPr>
+              <a:t> </a:t>
+            </a:r>
+            <a:r>
+              <a:rPr lang="de-DE" sz="1200" kern="1200" dirty="0" err="1" smtClean="0">
+                <a:solidFill>
+                  <a:schemeClr val="tx1"/>
+                </a:solidFill>
+                <a:latin typeface="+mn-lt"/>
+                <a:ea typeface="+mn-ea"/>
+                <a:cs typeface="+mn-cs"/>
+              </a:rPr>
+              <a:t>later</a:t>
+            </a:r>
+            <a:r>
+              <a:rPr lang="de-DE" sz="1200" kern="1200" dirty="0" smtClean="0">
+                <a:solidFill>
+                  <a:schemeClr val="tx1"/>
+                </a:solidFill>
+                <a:latin typeface="+mn-lt"/>
+                <a:ea typeface="+mn-ea"/>
+                <a:cs typeface="+mn-cs"/>
+              </a:rPr>
+              <a:t> </a:t>
+            </a:r>
+            <a:r>
+              <a:rPr lang="de-DE" sz="1200" kern="1200" dirty="0" err="1" smtClean="0">
+                <a:solidFill>
+                  <a:schemeClr val="tx1"/>
+                </a:solidFill>
+                <a:latin typeface="+mn-lt"/>
+                <a:ea typeface="+mn-ea"/>
+                <a:cs typeface="+mn-cs"/>
+              </a:rPr>
+              <a:t>be</a:t>
+            </a:r>
+            <a:r>
+              <a:rPr lang="de-DE" sz="1200" kern="1200" dirty="0" smtClean="0">
+                <a:solidFill>
+                  <a:schemeClr val="tx1"/>
+                </a:solidFill>
+                <a:latin typeface="+mn-lt"/>
+                <a:ea typeface="+mn-ea"/>
+                <a:cs typeface="+mn-cs"/>
+              </a:rPr>
+              <a:t> </a:t>
+            </a:r>
+            <a:r>
+              <a:rPr lang="de-DE" sz="1200" kern="1200" dirty="0" err="1" smtClean="0">
+                <a:solidFill>
+                  <a:schemeClr val="tx1"/>
+                </a:solidFill>
+                <a:latin typeface="+mn-lt"/>
+                <a:ea typeface="+mn-ea"/>
+                <a:cs typeface="+mn-cs"/>
+              </a:rPr>
+              <a:t>accessed</a:t>
+            </a:r>
+            <a:r>
+              <a:rPr lang="de-DE" sz="1200" kern="1200" dirty="0" smtClean="0">
+                <a:solidFill>
+                  <a:schemeClr val="tx1"/>
+                </a:solidFill>
+                <a:latin typeface="+mn-lt"/>
+                <a:ea typeface="+mn-ea"/>
+                <a:cs typeface="+mn-cs"/>
+              </a:rPr>
+              <a:t> via </a:t>
+            </a:r>
+            <a:r>
+              <a:rPr lang="de-DE" sz="1200" kern="1200" dirty="0" err="1" smtClean="0">
+                <a:solidFill>
+                  <a:schemeClr val="tx1"/>
+                </a:solidFill>
+                <a:latin typeface="+mn-lt"/>
+                <a:ea typeface="+mn-ea"/>
+                <a:cs typeface="+mn-cs"/>
+              </a:rPr>
+              <a:t>the</a:t>
+            </a:r>
+            <a:r>
+              <a:rPr lang="de-DE" sz="1200" kern="1200" dirty="0" smtClean="0">
+                <a:solidFill>
+                  <a:schemeClr val="tx1"/>
+                </a:solidFill>
+                <a:latin typeface="+mn-lt"/>
+                <a:ea typeface="+mn-ea"/>
+                <a:cs typeface="+mn-cs"/>
+              </a:rPr>
+              <a:t> </a:t>
+            </a:r>
+            <a:r>
+              <a:rPr lang="de-DE" sz="1200" kern="1200" dirty="0" err="1" smtClean="0">
+                <a:solidFill>
+                  <a:schemeClr val="tx1"/>
+                </a:solidFill>
+                <a:latin typeface="+mn-lt"/>
+                <a:ea typeface="+mn-ea"/>
+                <a:cs typeface="+mn-cs"/>
+              </a:rPr>
+              <a:t>local</a:t>
+            </a:r>
+            <a:r>
+              <a:rPr lang="de-DE" sz="1200" kern="1200" dirty="0" smtClean="0">
+                <a:solidFill>
+                  <a:schemeClr val="tx1"/>
+                </a:solidFill>
+                <a:latin typeface="+mn-lt"/>
+                <a:ea typeface="+mn-ea"/>
+                <a:cs typeface="+mn-cs"/>
+              </a:rPr>
+              <a:t> </a:t>
+            </a:r>
+            <a:r>
+              <a:rPr lang="de-DE" sz="1200" kern="1200" dirty="0" err="1" smtClean="0">
+                <a:solidFill>
+                  <a:schemeClr val="tx1"/>
+                </a:solidFill>
+                <a:latin typeface="+mn-lt"/>
+                <a:ea typeface="+mn-ea"/>
+                <a:cs typeface="+mn-cs"/>
+              </a:rPr>
+              <a:t>Condor</a:t>
+            </a:r>
+            <a:r>
+              <a:rPr lang="de-DE" sz="1200" kern="1200" dirty="0" smtClean="0">
+                <a:solidFill>
+                  <a:schemeClr val="tx1"/>
+                </a:solidFill>
+                <a:latin typeface="+mn-lt"/>
+                <a:ea typeface="+mn-ea"/>
+                <a:cs typeface="+mn-cs"/>
+              </a:rPr>
+              <a:t> </a:t>
+            </a:r>
+            <a:r>
+              <a:rPr lang="de-DE" sz="1200" kern="1200" dirty="0" err="1" smtClean="0">
+                <a:solidFill>
+                  <a:schemeClr val="tx1"/>
+                </a:solidFill>
+                <a:latin typeface="+mn-lt"/>
+                <a:ea typeface="+mn-ea"/>
+                <a:cs typeface="+mn-cs"/>
+              </a:rPr>
+              <a:t>pool</a:t>
+            </a:r>
+            <a:r>
+              <a:rPr lang="de-DE" sz="1200" kern="1200" dirty="0" smtClean="0">
+                <a:solidFill>
+                  <a:schemeClr val="tx1"/>
+                </a:solidFill>
+                <a:latin typeface="+mn-lt"/>
+                <a:ea typeface="+mn-ea"/>
+                <a:cs typeface="+mn-cs"/>
+              </a:rPr>
+              <a:t>.“</a:t>
+            </a:r>
+            <a:endParaRPr lang="en-US" dirty="0" smtClean="0"/>
+          </a:p>
+          <a:p>
+            <a:endParaRPr lang="de-DE" dirty="0"/>
+          </a:p>
+        </p:txBody>
+      </p:sp>
+      <p:sp>
+        <p:nvSpPr>
+          <p:cNvPr id="4" name="Foliennummernplatzhalter 3"/>
+          <p:cNvSpPr>
+            <a:spLocks noGrp="1"/>
+          </p:cNvSpPr>
+          <p:nvPr>
+            <p:ph type="sldNum" sz="quarter" idx="10"/>
+          </p:nvPr>
+        </p:nvSpPr>
+        <p:spPr/>
+        <p:txBody>
+          <a:bodyPr/>
+          <a:lstStyle/>
+          <a:p>
+            <a:fld id="{D344DA2A-F2F4-D74A-8AEC-1933B33E97E0}" type="slidenum">
+              <a:rPr lang="en-US" smtClean="0"/>
+              <a:pPr/>
+              <a:t>10</a:t>
+            </a:fld>
+            <a:endParaRPr lang="en-US"/>
+          </a:p>
+        </p:txBody>
+      </p:sp>
+    </p:spTree>
+  </p:cSld>
+  <p:clrMapOvr>
+    <a:masterClrMapping/>
+  </p:clrMapOvr>
+</p:notes>
+</file>
+
+<file path=ppt/notesSlides/notesSlide3.xml><?xml version="1.0" encoding="utf-8"?>
+<p:notes xmlns:a="http://schemas.openxmlformats.org/drawingml/2006/main" xmlns:r="http://schemas.openxmlformats.org/officeDocument/2006/relationships" xmlns:mc="http://schemas.openxmlformats.org/markup-compatibility/2006" xmlns:mv="urn:schemas-microsoft-com:mac:vml" xmlns:p="http://schemas.openxmlformats.org/presentationml/2006/main" mc:Ignorable="mv" mc:PreserveAttributes="mv:*">
+  <p:cSld>
     <p:bg>
       <p:bgPr>
         <a:solidFill>
@@ -887,7 +1439,7 @@
             <a:fld id="{4C4AD4EB-88D0-C141-9474-CCD86A78CB94}" type="datetimeFigureOut">
               <a:rPr lang="en-US" smtClean="0"/>
               <a:pPr/>
-              <a:t>5/16/10</a:t>
+              <a:t>17.05.2010</a:t>
             </a:fld>
             <a:endParaRPr lang="en-US" dirty="0"/>
           </a:p>
@@ -930,7 +1482,7 @@
             <a:fld id="{DF7665AF-92BA-E649-941D-268879B3EA81}" type="slidenum">
               <a:rPr lang="en-US" smtClean="0"/>
               <a:pPr/>
-              <a:t>‹#›</a:t>
+              <a:t>‹Nr.›</a:t>
             </a:fld>
             <a:endParaRPr lang="en-US"/>
           </a:p>
@@ -1210,7 +1762,7 @@
             <a:fld id="{4C4AD4EB-88D0-C141-9474-CCD86A78CB94}" type="datetimeFigureOut">
               <a:rPr lang="en-US" smtClean="0"/>
               <a:pPr/>
-              <a:t>5/16/10</a:t>
+              <a:t>17.05.2010</a:t>
             </a:fld>
             <a:endParaRPr lang="en-US"/>
           </a:p>
@@ -1253,7 +1805,7 @@
             <a:fld id="{DF7665AF-92BA-E649-941D-268879B3EA81}" type="slidenum">
               <a:rPr lang="en-US" smtClean="0"/>
               <a:pPr/>
-              <a:t>‹#›</a:t>
+              <a:t>‹Nr.›</a:t>
             </a:fld>
             <a:endParaRPr lang="en-US"/>
           </a:p>
@@ -1486,7 +2038,7 @@
             <a:fld id="{4C4AD4EB-88D0-C141-9474-CCD86A78CB94}" type="datetimeFigureOut">
               <a:rPr lang="en-US" smtClean="0"/>
               <a:pPr/>
-              <a:t>5/16/10</a:t>
+              <a:t>17.05.2010</a:t>
             </a:fld>
             <a:endParaRPr lang="en-US"/>
           </a:p>
@@ -1778,7 +2330,7 @@
             <a:fld id="{4C4AD4EB-88D0-C141-9474-CCD86A78CB94}" type="datetimeFigureOut">
               <a:rPr lang="en-US" smtClean="0"/>
               <a:pPr/>
-              <a:t>5/16/10</a:t>
+              <a:t>17.05.2010</a:t>
             </a:fld>
             <a:endParaRPr lang="en-US"/>
           </a:p>
@@ -2105,7 +2657,7 @@
             <a:fld id="{4C4AD4EB-88D0-C141-9474-CCD86A78CB94}" type="datetimeFigureOut">
               <a:rPr lang="en-US" smtClean="0"/>
               <a:pPr/>
-              <a:t>5/16/10</a:t>
+              <a:t>17.05.2010</a:t>
             </a:fld>
             <a:endParaRPr lang="en-US"/>
           </a:p>
@@ -2353,7 +2905,7 @@
             <a:fld id="{4C4AD4EB-88D0-C141-9474-CCD86A78CB94}" type="datetimeFigureOut">
               <a:rPr lang="en-US" smtClean="0"/>
               <a:pPr/>
-              <a:t>5/16/10</a:t>
+              <a:t>17.05.2010</a:t>
             </a:fld>
             <a:endParaRPr lang="en-US"/>
           </a:p>
@@ -2396,7 +2948,7 @@
             <a:fld id="{DF7665AF-92BA-E649-941D-268879B3EA81}" type="slidenum">
               <a:rPr lang="en-US" smtClean="0"/>
               <a:pPr/>
-              <a:t>‹#›</a:t>
+              <a:t>‹Nr.›</a:t>
             </a:fld>
             <a:endParaRPr lang="en-US"/>
           </a:p>
@@ -2530,7 +3082,7 @@
             <a:fld id="{4C4AD4EB-88D0-C141-9474-CCD86A78CB94}" type="datetimeFigureOut">
               <a:rPr lang="en-US" smtClean="0"/>
               <a:pPr/>
-              <a:t>5/16/10</a:t>
+              <a:t>17.05.2010</a:t>
             </a:fld>
             <a:endParaRPr lang="en-US"/>
           </a:p>
@@ -2573,7 +3125,7 @@
             <a:fld id="{DF7665AF-92BA-E649-941D-268879B3EA81}" type="slidenum">
               <a:rPr lang="en-US" smtClean="0"/>
               <a:pPr/>
-              <a:t>‹#›</a:t>
+              <a:t>‹Nr.›</a:t>
             </a:fld>
             <a:endParaRPr lang="en-US"/>
           </a:p>
@@ -2735,7 +3287,7 @@
               <a:pPr>
                 <a:defRPr/>
               </a:pPr>
-              <a:t>‹#›</a:t>
+              <a:t>‹Nr.›</a:t>
             </a:fld>
             <a:endParaRPr lang="en-US"/>
           </a:p>
@@ -2907,7 +3459,7 @@
             <a:fld id="{4C4AD4EB-88D0-C141-9474-CCD86A78CB94}" type="datetimeFigureOut">
               <a:rPr lang="en-US" smtClean="0"/>
               <a:pPr/>
-              <a:t>5/16/10</a:t>
+              <a:t>17.05.2010</a:t>
             </a:fld>
             <a:endParaRPr lang="en-US"/>
           </a:p>
@@ -2950,7 +3502,7 @@
             <a:fld id="{DF7665AF-92BA-E649-941D-268879B3EA81}" type="slidenum">
               <a:rPr lang="en-US" smtClean="0"/>
               <a:pPr/>
-              <a:t>‹#›</a:t>
+              <a:t>‹Nr.›</a:t>
             </a:fld>
             <a:endParaRPr lang="en-US"/>
           </a:p>
@@ -3210,7 +3762,7 @@
             <a:fld id="{4C4AD4EB-88D0-C141-9474-CCD86A78CB94}" type="datetimeFigureOut">
               <a:rPr lang="en-US" smtClean="0"/>
               <a:pPr/>
-              <a:t>5/16/10</a:t>
+              <a:t>17.05.2010</a:t>
             </a:fld>
             <a:endParaRPr lang="en-US"/>
           </a:p>
@@ -3518,7 +4070,7 @@
             <a:fld id="{4C4AD4EB-88D0-C141-9474-CCD86A78CB94}" type="datetimeFigureOut">
               <a:rPr lang="en-US" smtClean="0"/>
               <a:pPr/>
-              <a:t>5/16/10</a:t>
+              <a:t>17.05.2010</a:t>
             </a:fld>
             <a:endParaRPr lang="en-US"/>
           </a:p>
@@ -3561,7 +4113,7 @@
             <a:fld id="{DF7665AF-92BA-E649-941D-268879B3EA81}" type="slidenum">
               <a:rPr lang="en-US" smtClean="0"/>
               <a:pPr/>
-              <a:t>‹#›</a:t>
+              <a:t>‹Nr.›</a:t>
             </a:fld>
             <a:endParaRPr lang="en-US"/>
           </a:p>
@@ -3812,7 +4364,7 @@
             <a:fld id="{4C4AD4EB-88D0-C141-9474-CCD86A78CB94}" type="datetimeFigureOut">
               <a:rPr lang="en-US" smtClean="0"/>
               <a:pPr/>
-              <a:t>5/16/10</a:t>
+              <a:t>17.05.2010</a:t>
             </a:fld>
             <a:endParaRPr lang="en-US"/>
           </a:p>
@@ -3855,7 +4407,7 @@
             <a:fld id="{DF7665AF-92BA-E649-941D-268879B3EA81}" type="slidenum">
               <a:rPr lang="en-US" smtClean="0"/>
               <a:pPr/>
-              <a:t>‹#›</a:t>
+              <a:t>‹Nr.›</a:t>
             </a:fld>
             <a:endParaRPr lang="en-US"/>
           </a:p>
@@ -4244,7 +4796,7 @@
             <a:fld id="{4C4AD4EB-88D0-C141-9474-CCD86A78CB94}" type="datetimeFigureOut">
               <a:rPr lang="en-US" smtClean="0"/>
               <a:pPr/>
-              <a:t>5/16/10</a:t>
+              <a:t>17.05.2010</a:t>
             </a:fld>
             <a:endParaRPr lang="en-US"/>
           </a:p>
@@ -4292,7 +4844,7 @@
             <a:fld id="{DF7665AF-92BA-E649-941D-268879B3EA81}" type="slidenum">
               <a:rPr lang="en-US" smtClean="0"/>
               <a:pPr/>
-              <a:t>‹#›</a:t>
+              <a:t>‹Nr.›</a:t>
             </a:fld>
             <a:endParaRPr lang="en-US"/>
           </a:p>
@@ -4592,7 +5144,7 @@
             <a:fld id="{4C4AD4EB-88D0-C141-9474-CCD86A78CB94}" type="datetimeFigureOut">
               <a:rPr lang="en-US" smtClean="0"/>
               <a:pPr/>
-              <a:t>5/16/10</a:t>
+              <a:t>17.05.2010</a:t>
             </a:fld>
             <a:endParaRPr lang="en-US"/>
           </a:p>
@@ -4635,7 +5187,7 @@
             <a:fld id="{DF7665AF-92BA-E649-941D-268879B3EA81}" type="slidenum">
               <a:rPr lang="en-US" smtClean="0"/>
               <a:pPr/>
-              <a:t>‹#›</a:t>
+              <a:t>‹Nr.›</a:t>
             </a:fld>
             <a:endParaRPr lang="en-US"/>
           </a:p>
@@ -4684,7 +5236,7 @@
             <a:fld id="{4C4AD4EB-88D0-C141-9474-CCD86A78CB94}" type="datetimeFigureOut">
               <a:rPr lang="en-US" smtClean="0"/>
               <a:pPr/>
-              <a:t>5/16/10</a:t>
+              <a:t>17.05.2010</a:t>
             </a:fld>
             <a:endParaRPr lang="en-US"/>
           </a:p>
@@ -4727,7 +5279,7 @@
             <a:fld id="{DF7665AF-92BA-E649-941D-268879B3EA81}" type="slidenum">
               <a:rPr lang="en-US" smtClean="0"/>
               <a:pPr/>
-              <a:t>‹#›</a:t>
+              <a:t>‹Nr.›</a:t>
             </a:fld>
             <a:endParaRPr lang="en-US"/>
           </a:p>
@@ -5023,7 +5575,7 @@
             <a:fld id="{4C4AD4EB-88D0-C141-9474-CCD86A78CB94}" type="datetimeFigureOut">
               <a:rPr lang="en-US" smtClean="0"/>
               <a:pPr/>
-              <a:t>5/16/10</a:t>
+              <a:t>17.05.2010</a:t>
             </a:fld>
             <a:endParaRPr lang="en-US"/>
           </a:p>
@@ -5066,7 +5618,7 @@
             <a:fld id="{DF7665AF-92BA-E649-941D-268879B3EA81}" type="slidenum">
               <a:rPr lang="en-US" smtClean="0"/>
               <a:pPr/>
-              <a:t>‹#›</a:t>
+              <a:t>‹Nr.›</a:t>
             </a:fld>
             <a:endParaRPr lang="en-US"/>
           </a:p>
@@ -5237,7 +5789,7 @@
             <a:fld id="{4C4AD4EB-88D0-C141-9474-CCD86A78CB94}" type="datetimeFigureOut">
               <a:rPr lang="en-US" smtClean="0"/>
               <a:pPr/>
-              <a:t>5/16/10</a:t>
+              <a:t>17.05.2010</a:t>
             </a:fld>
             <a:endParaRPr lang="en-US"/>
           </a:p>
@@ -5318,7 +5870,7 @@
             <a:fld id="{DF7665AF-92BA-E649-941D-268879B3EA81}" type="slidenum">
               <a:rPr lang="en-US" smtClean="0"/>
               <a:pPr/>
-              <a:t>‹#›</a:t>
+              <a:t>‹Nr.›</a:t>
             </a:fld>
             <a:endParaRPr lang="en-US"/>
           </a:p>
@@ -5831,11 +6383,7 @@
             </a:r>
             <a:r>
               <a:rPr lang="en-US" sz="2200" dirty="0" smtClean="0"/>
-              <a:t> and </a:t>
-            </a:r>
-            <a:r>
-              <a:rPr lang="en-US" sz="2200" dirty="0" smtClean="0"/>
-              <a:t>Shantenu Jha</a:t>
+              <a:t> and Shantenu Jha</a:t>
             </a:r>
           </a:p>
           <a:p>
@@ -5847,13 +6395,7 @@
               <a:rPr lang="en-US" sz="2400" dirty="0" smtClean="0">
                 <a:hlinkClick r:id="rId3"/>
               </a:rPr>
-              <a:t>http</a:t>
-            </a:r>
-            <a:r>
-              <a:rPr lang="en-US" sz="2400" dirty="0" smtClean="0">
-                <a:hlinkClick r:id="rId3"/>
-              </a:rPr>
-              <a:t>://saga.cct.lsu.edu/</a:t>
+              <a:t>http://saga.cct.lsu.edu/</a:t>
             </a:r>
             <a:r>
               <a:rPr lang="en-US" sz="2400" dirty="0" smtClean="0"/>
@@ -5897,35 +6439,7 @@
             </a:r>
             <a:r>
               <a:rPr lang="en-US" sz="2400" dirty="0" smtClean="0"/>
-              <a:t>: An </a:t>
-            </a:r>
-            <a:r>
-              <a:rPr lang="en-US" sz="2400" dirty="0" smtClean="0"/>
-              <a:t>Extensible, Interoperable </a:t>
-            </a:r>
-            <a:r>
-              <a:rPr lang="en-US" sz="2400" dirty="0" smtClean="0"/>
-              <a:t>Pilot-Job Abstraction </a:t>
-            </a:r>
-            <a:r>
-              <a:rPr lang="en-US" sz="2400" dirty="0" smtClean="0"/>
-              <a:t>for Distributed </a:t>
-            </a:r>
-            <a:r>
-              <a:rPr lang="en-US" sz="2400" dirty="0" smtClean="0"/>
-              <a:t>Applications</a:t>
-            </a:r>
-            <a:r>
-              <a:rPr lang="en-US" sz="2400" dirty="0" smtClean="0"/>
-              <a:t> </a:t>
-            </a:r>
-            <a:r>
-              <a:rPr lang="en-US" sz="2400" dirty="0" smtClean="0"/>
-              <a:t>&amp;</a:t>
-            </a:r>
-            <a:r>
-              <a:rPr lang="en-US" sz="2400" dirty="0" smtClean="0"/>
-              <a:t> Systems</a:t>
+              <a:t>: An Extensible, Interoperable Pilot-Job Abstraction for Distributed Applications &amp; Systems</a:t>
             </a:r>
             <a:endParaRPr lang="en-US" sz="2800" dirty="0"/>
           </a:p>
@@ -6091,15 +6605,7 @@
           <a:p>
             <a:r>
               <a:rPr lang="en-US" sz="2600" dirty="0" smtClean="0"/>
-              <a:t>SAGA </a:t>
-            </a:r>
-            <a:r>
-              <a:rPr lang="en-US" sz="2600" dirty="0" smtClean="0"/>
-              <a:t>Pilot-</a:t>
-            </a:r>
-            <a:r>
-              <a:rPr lang="en-US" sz="2600" dirty="0" smtClean="0"/>
-              <a:t>Job:  Condor (2) </a:t>
+              <a:t>SAGA Pilot-Job:  Condor (2) </a:t>
             </a:r>
             <a:endParaRPr lang="en-US" sz="2600" dirty="0"/>
           </a:p>
@@ -6117,14 +6623,92 @@
         </p:nvSpPr>
         <p:spPr/>
         <p:txBody>
-          <a:bodyPr/>
+          <a:bodyPr>
+            <a:normAutofit fontScale="92500" lnSpcReduction="10000"/>
+          </a:bodyPr>
           <a:lstStyle/>
           <a:p>
             <a:r>
               <a:rPr lang="en-US" dirty="0" smtClean="0"/>
-              <a:t>Lukasz Please add descriptive text</a:t>
+              <a:t>Re-use of the Condor </a:t>
+            </a:r>
+            <a:r>
+              <a:rPr lang="en-US" dirty="0" smtClean="0"/>
+              <a:t>Glide-In native Pilot-Job functionality</a:t>
+            </a:r>
+          </a:p>
+          <a:p>
+            <a:r>
+              <a:rPr lang="en-US" dirty="0" smtClean="0"/>
+              <a:t>To use </a:t>
+            </a:r>
+            <a:r>
+              <a:rPr lang="en-US" dirty="0" err="1" smtClean="0"/>
+              <a:t>BigJob</a:t>
+            </a:r>
+            <a:r>
+              <a:rPr lang="en-US" dirty="0" smtClean="0"/>
+              <a:t> Condor a local Condor pool is required</a:t>
+            </a:r>
+          </a:p>
+          <a:p>
+            <a:r>
+              <a:rPr lang="en-US" dirty="0" smtClean="0"/>
+              <a:t>With the instantiation of a big-job object a Condor Glide-In (Condor-G) job is started at the remote resource via the SAGA Condor adaptor</a:t>
+            </a:r>
+          </a:p>
+          <a:p>
+            <a:r>
+              <a:rPr lang="en-US" dirty="0" smtClean="0"/>
+              <a:t>The Condor-G job starts the master and </a:t>
+            </a:r>
+            <a:r>
+              <a:rPr lang="en-US" dirty="0" err="1" smtClean="0"/>
+              <a:t>startd</a:t>
+            </a:r>
+            <a:r>
+              <a:rPr lang="en-US" dirty="0" smtClean="0"/>
+              <a:t> daemon on the remote resource and adds these resources to the local Condor pool</a:t>
+            </a:r>
+          </a:p>
+          <a:p>
+            <a:r>
+              <a:rPr lang="en-US" dirty="0" smtClean="0"/>
+              <a:t>Sub-jobs are dispatched to remote resources via the SAGA Condor adaptor and the local Condor pool</a:t>
+            </a:r>
+          </a:p>
+          <a:p>
+            <a:r>
+              <a:rPr lang="en-US" dirty="0" smtClean="0"/>
+              <a:t>Advanced Condor capabilities, such as matchmaking, scheduling and automatic re-scheduling, are re-used </a:t>
             </a:r>
             <a:endParaRPr lang="en-US" dirty="0"/>
+          </a:p>
+        </p:txBody>
+      </p:sp>
+      <p:sp>
+        <p:nvSpPr>
+          <p:cNvPr id="5" name="Textfeld 4"/>
+          <p:cNvSpPr txBox="1"/>
+          <p:nvPr/>
+        </p:nvSpPr>
+        <p:spPr>
+          <a:xfrm>
+            <a:off x="8406389" y="1710720"/>
+            <a:ext cx="184666" cy="369332"/>
+          </a:xfrm>
+          <a:prstGeom prst="rect">
+            <a:avLst/>
+          </a:prstGeom>
+          <a:noFill/>
+        </p:spPr>
+        <p:txBody>
+          <a:bodyPr wrap="none" rtlCol="0">
+            <a:spAutoFit/>
+          </a:bodyPr>
+          <a:lstStyle/>
+          <a:p>
+            <a:endParaRPr lang="de-DE" dirty="0"/>
           </a:p>
         </p:txBody>
       </p:sp>
@@ -6179,38 +6763,115 @@
           <a:p>
             <a:r>
               <a:rPr lang="en-US" sz="2600" dirty="0" smtClean="0"/>
+              <a:t>SAGA Pilot-Job:  Cloud </a:t>
+            </a:r>
+            <a:endParaRPr lang="en-US" sz="2600" dirty="0"/>
+          </a:p>
+        </p:txBody>
+      </p:sp>
+      <p:sp>
+        <p:nvSpPr>
+          <p:cNvPr id="4" name="Content Placeholder 3"/>
+          <p:cNvSpPr>
+            <a:spLocks noGrp="1"/>
+          </p:cNvSpPr>
+          <p:nvPr>
+            <p:ph idx="1"/>
+          </p:nvPr>
+        </p:nvSpPr>
+        <p:spPr/>
+        <p:txBody>
+          <a:bodyPr>
+            <a:normAutofit lnSpcReduction="10000"/>
+          </a:bodyPr>
+          <a:lstStyle/>
+          <a:p>
+            <a:r>
+              <a:rPr lang="en-US" dirty="0" smtClean="0"/>
               <a:t>SAGA </a:t>
             </a:r>
             <a:r>
-              <a:rPr lang="en-US" sz="2600" dirty="0" smtClean="0"/>
-              <a:t>Pilot-</a:t>
-            </a:r>
-            <a:r>
-              <a:rPr lang="en-US" sz="2600" dirty="0" smtClean="0"/>
-              <a:t>Job:  Cloud </a:t>
-            </a:r>
-            <a:endParaRPr lang="en-US" sz="2600" dirty="0"/>
-          </a:p>
-        </p:txBody>
-      </p:sp>
-      <p:sp>
-        <p:nvSpPr>
-          <p:cNvPr id="4" name="Content Placeholder 3"/>
-          <p:cNvSpPr>
-            <a:spLocks noGrp="1"/>
-          </p:cNvSpPr>
-          <p:nvPr>
-            <p:ph idx="1"/>
-          </p:nvPr>
-        </p:nvSpPr>
-        <p:spPr/>
-        <p:txBody>
-          <a:bodyPr/>
-          <a:lstStyle/>
-          <a:p>
+              <a:rPr lang="en-US" dirty="0" err="1" smtClean="0"/>
+              <a:t>BigJob</a:t>
+            </a:r>
             <a:r>
               <a:rPr lang="en-US" dirty="0" smtClean="0"/>
-              <a:t>Please add material about SAGA-Clouds</a:t>
+              <a:t> API provides unified abstraction to different Cloud </a:t>
+            </a:r>
+            <a:r>
+              <a:rPr lang="en-US" dirty="0" err="1" smtClean="0"/>
+              <a:t>backends</a:t>
+            </a:r>
+            <a:r>
+              <a:rPr lang="en-US" dirty="0" smtClean="0"/>
+              <a:t>. Backend specifics are encapsulated in a resource adaptor:</a:t>
+            </a:r>
+          </a:p>
+          <a:p>
+            <a:pPr lvl="1"/>
+            <a:r>
+              <a:rPr lang="en-US" dirty="0" smtClean="0"/>
+              <a:t>Amazon EC2</a:t>
+            </a:r>
+          </a:p>
+          <a:p>
+            <a:pPr lvl="1"/>
+            <a:r>
+              <a:rPr lang="en-US" dirty="0" smtClean="0"/>
+              <a:t>Eucalyptus (</a:t>
+            </a:r>
+            <a:r>
+              <a:rPr lang="en-US" dirty="0" err="1" smtClean="0"/>
+              <a:t>FutureGrid</a:t>
+            </a:r>
+            <a:r>
+              <a:rPr lang="en-US" dirty="0" smtClean="0"/>
+              <a:t>)</a:t>
+            </a:r>
+          </a:p>
+          <a:p>
+            <a:pPr lvl="1"/>
+            <a:r>
+              <a:rPr lang="en-US" dirty="0" smtClean="0"/>
+              <a:t>Nimbus (</a:t>
+            </a:r>
+            <a:r>
+              <a:rPr lang="en-US" dirty="0" err="1" smtClean="0"/>
+              <a:t>ScienceCloud</a:t>
+            </a:r>
+            <a:r>
+              <a:rPr lang="en-US" dirty="0" smtClean="0"/>
+              <a:t>)</a:t>
+            </a:r>
+          </a:p>
+          <a:p>
+            <a:r>
+              <a:rPr lang="en-US" dirty="0" smtClean="0"/>
+              <a:t>VM images are setup during </a:t>
+            </a:r>
+            <a:r>
+              <a:rPr lang="en-US" dirty="0" smtClean="0"/>
+              <a:t>the initialization of big-job object</a:t>
+            </a:r>
+          </a:p>
+          <a:p>
+            <a:r>
+              <a:rPr lang="en-US" dirty="0" smtClean="0"/>
+              <a:t>No agent on image necessary – sub-jobs are directly dispatched by the </a:t>
+            </a:r>
+            <a:r>
+              <a:rPr lang="en-US" dirty="0" err="1" smtClean="0"/>
+              <a:t>BigJob</a:t>
+            </a:r>
+            <a:r>
+              <a:rPr lang="en-US" dirty="0" smtClean="0"/>
+              <a:t> Manager via the SAGA SSH adaptor</a:t>
+            </a:r>
+          </a:p>
+          <a:p>
+            <a:r>
+              <a:rPr lang="en-US" dirty="0" smtClean="0"/>
+              <a:t>Full support for MPI jobs on virtual VM clusters</a:t>
             </a:r>
             <a:endParaRPr lang="en-US" dirty="0"/>
           </a:p>
@@ -6486,22 +7147,13 @@
               <a:rPr lang="en-GB" sz="2800" dirty="0" smtClean="0"/>
               <a:t>Generalized Ensemble Methods:</a:t>
             </a:r>
-            <a:r>
-              <a:rPr lang="en-GB" sz="2800" dirty="0" smtClean="0"/>
-              <a:t/>
-            </a:r>
             <a:br>
               <a:rPr lang="en-GB" sz="2800" dirty="0" smtClean="0"/>
             </a:br>
             <a:r>
               <a:rPr lang="en-GB" sz="2800" dirty="0" smtClean="0"/>
-              <a:t>Ensembles Can </a:t>
-            </a:r>
-            <a:r>
-              <a:rPr lang="en-GB" sz="2800" dirty="0" smtClean="0"/>
-              <a:t>Enhance Sampling</a:t>
-            </a:r>
-            <a:endParaRPr lang="en-GB" sz="2800" dirty="0" smtClean="0"/>
+              <a:t>Ensembles Can Enhance Sampling</a:t>
+            </a:r>
           </a:p>
         </p:txBody>
       </p:sp>
@@ -6842,13 +7494,7 @@
               <a:rPr lang="en-GB" sz="1700" dirty="0" smtClean="0">
                 <a:latin typeface="Avant Garde Gothic" pitchFamily="32" charset="0"/>
               </a:rPr>
-              <a:t>; Repeat till </a:t>
-            </a:r>
-            <a:r>
-              <a:rPr lang="en-GB" sz="1700" dirty="0" smtClean="0">
-                <a:latin typeface="Avant Garde Gothic" pitchFamily="32" charset="0"/>
-              </a:rPr>
-              <a:t>finish</a:t>
+              <a:t>; Repeat till finish</a:t>
             </a:r>
           </a:p>
           <a:p>
@@ -9650,27 +10296,7 @@
           <a:p>
             <a:r>
               <a:rPr lang="en-US" dirty="0" smtClean="0"/>
-              <a:t>Scenario </a:t>
-            </a:r>
-            <a:r>
-              <a:rPr lang="en-US" dirty="0" smtClean="0"/>
-              <a:t>A-1: </a:t>
-            </a:r>
-            <a:r>
-              <a:rPr lang="en-US" dirty="0" smtClean="0"/>
-              <a:t>NAMD </a:t>
-            </a:r>
-            <a:r>
-              <a:rPr lang="en-US" dirty="0" smtClean="0"/>
-              <a:t>Performance for </a:t>
-            </a:r>
-            <a:r>
-              <a:rPr lang="en-US" dirty="0" smtClean="0"/>
-              <a:t>Different Resource </a:t>
-            </a:r>
-            <a:r>
-              <a:rPr lang="en-US" dirty="0" smtClean="0"/>
-              <a:t>Configurations</a:t>
+              <a:t>Scenario A-1: NAMD Performance for Different Resource Configurations</a:t>
             </a:r>
             <a:endParaRPr lang="en-US" dirty="0"/>
           </a:p>
@@ -9751,11 +10377,7 @@
             </a:r>
             <a:r>
               <a:rPr lang="en-US" sz="2400" dirty="0" smtClean="0"/>
-              <a:t> for Different </a:t>
-            </a:r>
-            <a:r>
-              <a:rPr lang="en-US" sz="2400" dirty="0" smtClean="0"/>
-              <a:t>Resource Configurations </a:t>
+              <a:t> for Different Resource Configurations </a:t>
             </a:r>
             <a:endParaRPr lang="en-US" sz="2400" baseline="-25000" dirty="0"/>
           </a:p>
@@ -9778,18 +10400,37 @@
           </a:xfrm>
         </p:spPr>
         <p:txBody>
-          <a:bodyPr/>
+          <a:bodyPr>
+            <a:normAutofit lnSpcReduction="10000"/>
+          </a:bodyPr>
           <a:lstStyle/>
           <a:p>
             <a:r>
               <a:rPr lang="en-US" dirty="0" smtClean="0"/>
               <a:t>Each experiment was for 8 ensembles; repeated 4 times</a:t>
             </a:r>
+            <a:endParaRPr lang="en-US" dirty="0" smtClean="0"/>
           </a:p>
           <a:p>
             <a:r>
               <a:rPr lang="en-US" dirty="0" smtClean="0"/>
-              <a:t>More details…. </a:t>
+              <a:t>Cloud resources alone less suitable for tightly coupled workloads</a:t>
+            </a:r>
+          </a:p>
+          <a:p>
+            <a:r>
+              <a:rPr lang="en-US" dirty="0" smtClean="0"/>
+              <a:t>If Grid and Condor resources are only lightly loaded, additional Cloud resources provide no benefits</a:t>
+            </a:r>
+          </a:p>
+          <a:p>
+            <a:r>
+              <a:rPr lang="en-US" dirty="0" smtClean="0"/>
+              <a:t>However, </a:t>
+            </a:r>
+            <a:r>
+              <a:rPr lang="en-US" dirty="0" smtClean="0"/>
+              <a:t>Cloud resources provide great benefits if on-premise resources are heavily loaded</a:t>
             </a:r>
             <a:endParaRPr lang="en-US" dirty="0"/>
           </a:p>
@@ -9870,15 +10511,7 @@
           <a:p>
             <a:r>
               <a:rPr lang="en-US" sz="2400" dirty="0" smtClean="0"/>
-              <a:t>Scenario B:</a:t>
-            </a:r>
-            <a:r>
-              <a:rPr lang="en-US" sz="2400" dirty="0" smtClean="0"/>
-              <a:t> Facilitating </a:t>
-            </a:r>
-            <a:r>
-              <a:rPr lang="en-US" sz="2400" dirty="0" smtClean="0"/>
-              <a:t>Novel Execution Modes</a:t>
+              <a:t>Scenario B: Facilitating Novel Execution Modes</a:t>
             </a:r>
             <a:br>
               <a:rPr lang="en-US" sz="2400" dirty="0" smtClean="0"/>
@@ -9918,7 +10551,6 @@
               <a:rPr lang="en-US" dirty="0" smtClean="0"/>
               <a:t>Adapt workload distribution and resource utilization to ensure completion</a:t>
             </a:r>
-            <a:endParaRPr lang="en-US" dirty="0" smtClean="0"/>
           </a:p>
           <a:p>
             <a:r>
@@ -9945,11 +10577,7 @@
             </a:r>
             <a:r>
               <a:rPr lang="en-US" dirty="0" smtClean="0"/>
-              <a:t> cold; o</a:t>
-            </a:r>
-            <a:r>
-              <a:rPr lang="en-US" dirty="0" smtClean="0"/>
-              <a:t>r hot</a:t>
+              <a:t> cold; or hot</a:t>
             </a:r>
             <a:endParaRPr lang="en-US" dirty="0"/>
           </a:p>
@@ -10029,23 +10657,91 @@
         </p:nvSpPr>
         <p:spPr>
           <a:xfrm>
-            <a:off x="656566" y="3794273"/>
-            <a:ext cx="8235941" cy="2223663"/>
+            <a:off x="656566" y="2989440"/>
+            <a:ext cx="8235941" cy="3868560"/>
           </a:xfrm>
         </p:spPr>
         <p:txBody>
           <a:bodyPr>
-            <a:normAutofit/>
+            <a:normAutofit lnSpcReduction="10000"/>
           </a:bodyPr>
           <a:lstStyle/>
           <a:p>
             <a:r>
               <a:rPr lang="en-US" dirty="0" smtClean="0"/>
-              <a:t>Experiments </a:t>
+              <a:t>Scenario: Ensuring a deadline </a:t>
+            </a:r>
+            <a:r>
+              <a:rPr lang="en-US" dirty="0" err="1" smtClean="0"/>
+              <a:t>T</a:t>
+            </a:r>
+            <a:r>
+              <a:rPr lang="en-US" sz="1600" baseline="-25000" dirty="0" err="1" smtClean="0"/>
+              <a:t>M</a:t>
+            </a:r>
+            <a:r>
+              <a:rPr lang="en-US" sz="1600" baseline="-25000" dirty="0" err="1" smtClean="0"/>
+              <a:t>ax</a:t>
             </a:r>
             <a:r>
               <a:rPr lang="en-US" dirty="0" smtClean="0"/>
-              <a:t>performed 10 times; Resources used… </a:t>
+              <a:t> </a:t>
+            </a:r>
+            <a:r>
+              <a:rPr lang="en-US" dirty="0" smtClean="0"/>
+              <a:t>for a 8 replica NAMD workload </a:t>
+            </a:r>
+            <a:endParaRPr lang="en-US" dirty="0" smtClean="0"/>
+          </a:p>
+          <a:p>
+            <a:r>
+              <a:rPr lang="en-US" dirty="0" smtClean="0"/>
+              <a:t>Experiment </a:t>
+            </a:r>
+            <a:r>
+              <a:rPr lang="en-US" dirty="0" smtClean="0"/>
+              <a:t>performed 10 times; </a:t>
+            </a:r>
+            <a:r>
+              <a:rPr lang="en-US" dirty="0" smtClean="0"/>
+              <a:t>Resources used: LONI and Nimbus </a:t>
+            </a:r>
+            <a:r>
+              <a:rPr lang="en-US" dirty="0" err="1" smtClean="0"/>
+              <a:t>ScienceCloud</a:t>
+            </a:r>
+            <a:endParaRPr lang="en-US" dirty="0" smtClean="0"/>
+          </a:p>
+          <a:p>
+            <a:r>
+              <a:rPr lang="en-US" dirty="0" smtClean="0"/>
+              <a:t>Progress Manager periodically monitors the progress of the computation and initiates additional big-job objects if necessary (Monitoring interval: 4 minutes)</a:t>
+            </a:r>
+          </a:p>
+          <a:p>
+            <a:r>
+              <a:rPr lang="en-US" dirty="0" smtClean="0"/>
+              <a:t>In 60% of the cases no measures necessary. To </a:t>
+            </a:r>
+            <a:r>
+              <a:rPr lang="en-US" dirty="0" smtClean="0"/>
+              <a:t>hold the defined deadline of 45 minutes additional </a:t>
+            </a:r>
+            <a:r>
+              <a:rPr lang="en-US" dirty="0" err="1" smtClean="0"/>
+              <a:t>VMs</a:t>
+            </a:r>
+            <a:r>
+              <a:rPr lang="en-US" dirty="0" smtClean="0"/>
+              <a:t> had to be started </a:t>
+            </a:r>
+            <a:r>
+              <a:rPr lang="en-US" dirty="0" smtClean="0"/>
+              <a:t>in 40% of the </a:t>
+            </a:r>
+            <a:r>
+              <a:rPr lang="en-US" dirty="0" smtClean="0"/>
+              <a:t>cases. </a:t>
             </a:r>
             <a:endParaRPr lang="en-US" dirty="0" smtClean="0"/>
           </a:p>
@@ -10073,8 +10769,8 @@
         </p:blipFill>
         <p:spPr>
           <a:xfrm>
-            <a:off x="2639283" y="-38893"/>
-            <a:ext cx="4298091" cy="4436998"/>
+            <a:off x="2639283" y="0"/>
+            <a:ext cx="4298091" cy="3970093"/>
           </a:xfrm>
         </p:spPr>
       </p:pic>
@@ -11776,15 +12472,7 @@
           <a:p>
             <a:r>
               <a:rPr lang="en-US" sz="2600" dirty="0" smtClean="0"/>
-              <a:t>SAGA </a:t>
-            </a:r>
-            <a:r>
-              <a:rPr lang="en-US" sz="2600" dirty="0" smtClean="0"/>
-              <a:t>Pilot-</a:t>
-            </a:r>
-            <a:r>
-              <a:rPr lang="en-US" sz="2600" dirty="0" smtClean="0"/>
-              <a:t>Job:  Condor </a:t>
+              <a:t>SAGA Pilot-Job:  Condor </a:t>
             </a:r>
             <a:endParaRPr lang="en-US" sz="2600" dirty="0"/>
           </a:p>

</xml_diff>